<commit_message>
Sign-in html finished --URLs and names should be editted to operate with backend
</commit_message>
<xml_diff>
--- a/prototypes/prototype.pptx
+++ b/prototypes/prototype.pptx
@@ -105,6 +105,11 @@
       </a:defRPr>
     </a:lvl9pPr>
   </p:defaultTextStyle>
+  <p:extLst>
+    <p:ext uri="{EFAFB233-063F-42B5-8137-9DF3F51BA10A}">
+      <p15:sldGuideLst xmlns:p15="http://schemas.microsoft.com/office/powerpoint/2012/main"/>
+    </p:ext>
+  </p:extLst>
 </p:presentation>
 </file>
 
@@ -239,7 +244,7 @@
           <a:p>
             <a:fld id="{32EB4D07-6197-4565-9AD8-FEDB8A1B66CA}" type="datetimeFigureOut">
               <a:rPr lang="en-US" smtClean="0"/>
-              <a:t>1/4/2023</a:t>
+              <a:t>1/5/2023</a:t>
             </a:fld>
             <a:endParaRPr lang="en-US"/>
           </a:p>
@@ -409,7 +414,7 @@
           <a:p>
             <a:fld id="{32EB4D07-6197-4565-9AD8-FEDB8A1B66CA}" type="datetimeFigureOut">
               <a:rPr lang="en-US" smtClean="0"/>
-              <a:t>1/4/2023</a:t>
+              <a:t>1/5/2023</a:t>
             </a:fld>
             <a:endParaRPr lang="en-US"/>
           </a:p>
@@ -589,7 +594,7 @@
           <a:p>
             <a:fld id="{32EB4D07-6197-4565-9AD8-FEDB8A1B66CA}" type="datetimeFigureOut">
               <a:rPr lang="en-US" smtClean="0"/>
-              <a:t>1/4/2023</a:t>
+              <a:t>1/5/2023</a:t>
             </a:fld>
             <a:endParaRPr lang="en-US"/>
           </a:p>
@@ -759,7 +764,7 @@
           <a:p>
             <a:fld id="{32EB4D07-6197-4565-9AD8-FEDB8A1B66CA}" type="datetimeFigureOut">
               <a:rPr lang="en-US" smtClean="0"/>
-              <a:t>1/4/2023</a:t>
+              <a:t>1/5/2023</a:t>
             </a:fld>
             <a:endParaRPr lang="en-US"/>
           </a:p>
@@ -1005,7 +1010,7 @@
           <a:p>
             <a:fld id="{32EB4D07-6197-4565-9AD8-FEDB8A1B66CA}" type="datetimeFigureOut">
               <a:rPr lang="en-US" smtClean="0"/>
-              <a:t>1/4/2023</a:t>
+              <a:t>1/5/2023</a:t>
             </a:fld>
             <a:endParaRPr lang="en-US"/>
           </a:p>
@@ -1237,7 +1242,7 @@
           <a:p>
             <a:fld id="{32EB4D07-6197-4565-9AD8-FEDB8A1B66CA}" type="datetimeFigureOut">
               <a:rPr lang="en-US" smtClean="0"/>
-              <a:t>1/4/2023</a:t>
+              <a:t>1/5/2023</a:t>
             </a:fld>
             <a:endParaRPr lang="en-US"/>
           </a:p>
@@ -1604,7 +1609,7 @@
           <a:p>
             <a:fld id="{32EB4D07-6197-4565-9AD8-FEDB8A1B66CA}" type="datetimeFigureOut">
               <a:rPr lang="en-US" smtClean="0"/>
-              <a:t>1/4/2023</a:t>
+              <a:t>1/5/2023</a:t>
             </a:fld>
             <a:endParaRPr lang="en-US"/>
           </a:p>
@@ -1722,7 +1727,7 @@
           <a:p>
             <a:fld id="{32EB4D07-6197-4565-9AD8-FEDB8A1B66CA}" type="datetimeFigureOut">
               <a:rPr lang="en-US" smtClean="0"/>
-              <a:t>1/4/2023</a:t>
+              <a:t>1/5/2023</a:t>
             </a:fld>
             <a:endParaRPr lang="en-US"/>
           </a:p>
@@ -1817,7 +1822,7 @@
           <a:p>
             <a:fld id="{32EB4D07-6197-4565-9AD8-FEDB8A1B66CA}" type="datetimeFigureOut">
               <a:rPr lang="en-US" smtClean="0"/>
-              <a:t>1/4/2023</a:t>
+              <a:t>1/5/2023</a:t>
             </a:fld>
             <a:endParaRPr lang="en-US"/>
           </a:p>
@@ -2094,7 +2099,7 @@
           <a:p>
             <a:fld id="{32EB4D07-6197-4565-9AD8-FEDB8A1B66CA}" type="datetimeFigureOut">
               <a:rPr lang="en-US" smtClean="0"/>
-              <a:t>1/4/2023</a:t>
+              <a:t>1/5/2023</a:t>
             </a:fld>
             <a:endParaRPr lang="en-US"/>
           </a:p>
@@ -2347,7 +2352,7 @@
           <a:p>
             <a:fld id="{32EB4D07-6197-4565-9AD8-FEDB8A1B66CA}" type="datetimeFigureOut">
               <a:rPr lang="en-US" smtClean="0"/>
-              <a:t>1/4/2023</a:t>
+              <a:t>1/5/2023</a:t>
             </a:fld>
             <a:endParaRPr lang="en-US"/>
           </a:p>
@@ -2560,7 +2565,7 @@
           <a:p>
             <a:fld id="{32EB4D07-6197-4565-9AD8-FEDB8A1B66CA}" type="datetimeFigureOut">
               <a:rPr lang="en-US" smtClean="0"/>
-              <a:t>1/4/2023</a:t>
+              <a:t>1/5/2023</a:t>
             </a:fld>
             <a:endParaRPr lang="en-US"/>
           </a:p>
@@ -3792,6 +3797,36 @@
           </a:p>
         </p:txBody>
       </p:sp>
+      <p:sp>
+        <p:nvSpPr>
+          <p:cNvPr id="3" name="TextBox 2"/>
+          <p:cNvSpPr txBox="1"/>
+          <p:nvPr/>
+        </p:nvSpPr>
+        <p:spPr>
+          <a:xfrm>
+            <a:off x="3721768" y="6352674"/>
+            <a:ext cx="3818021" cy="369332"/>
+          </a:xfrm>
+          <a:prstGeom prst="rect">
+            <a:avLst/>
+          </a:prstGeom>
+          <a:noFill/>
+        </p:spPr>
+        <p:txBody>
+          <a:bodyPr wrap="square" rtlCol="0">
+            <a:spAutoFit/>
+          </a:bodyPr>
+          <a:lstStyle/>
+          <a:p>
+            <a:r>
+              <a:rPr lang="en-US" dirty="0" smtClean="0"/>
+              <a:t>And white</a:t>
+            </a:r>
+            <a:endParaRPr lang="en-US" dirty="0"/>
+          </a:p>
+        </p:txBody>
+      </p:sp>
     </p:spTree>
     <p:extLst>
       <p:ext uri="{BB962C8B-B14F-4D97-AF65-F5344CB8AC3E}">

</xml_diff>

<commit_message>
sign in front completed -- [backend] value and name and method should be cheked with backend1
</commit_message>
<xml_diff>
--- a/prototypes/prototype.pptx
+++ b/prototypes/prototype.pptx
@@ -3021,7 +3021,7 @@
         </p:nvSpPr>
         <p:spPr>
           <a:xfrm>
-            <a:off x="2987039" y="130629"/>
+            <a:off x="2987039" y="121921"/>
             <a:ext cx="5242559" cy="5660572"/>
           </a:xfrm>
           <a:prstGeom prst="roundRect">
@@ -3221,8 +3221,11 @@
           <a:bodyPr rtlCol="0" anchor="ctr"/>
           <a:lstStyle/>
           <a:p>
-            <a:pPr algn="ctr"/>
-            <a:endParaRPr lang="en-US"/>
+            <a:r>
+              <a:rPr lang="en-US" dirty="0" smtClean="0"/>
+              <a:t>John</a:t>
+            </a:r>
+            <a:endParaRPr lang="en-US" dirty="0"/>
           </a:p>
         </p:txBody>
       </p:sp>

</xml_diff>